<commit_message>
Some corrections to the thesis up to Chapter 3
</commit_message>
<xml_diff>
--- a/images/mathematical_model/linear_dashpot_force.pptx
+++ b/images/mathematical_model/linear_dashpot_force.pptx
@@ -104,6 +104,11 @@
       </a:defRPr>
     </a:lvl9pPr>
   </p:defaultTextStyle>
+  <p:extLst>
+    <p:ext uri="{EFAFB233-063F-42B5-8137-9DF3F51BA10A}">
+      <p15:sldGuideLst xmlns:p15="http://schemas.microsoft.com/office/powerpoint/2012/main"/>
+    </p:ext>
+  </p:extLst>
 </p:presentation>
 </file>
 
@@ -242,7 +247,7 @@
           <a:p>
             <a:fld id="{B7ABE7E8-7B11-42D2-9714-455998F959AF}" type="datetimeFigureOut">
               <a:rPr lang="pt-BR" smtClean="0"/>
-              <a:t>08/12/2017</a:t>
+              <a:t>14/12/2017</a:t>
             </a:fld>
             <a:endParaRPr lang="pt-BR"/>
           </a:p>
@@ -412,7 +417,7 @@
           <a:p>
             <a:fld id="{B7ABE7E8-7B11-42D2-9714-455998F959AF}" type="datetimeFigureOut">
               <a:rPr lang="pt-BR" smtClean="0"/>
-              <a:t>08/12/2017</a:t>
+              <a:t>14/12/2017</a:t>
             </a:fld>
             <a:endParaRPr lang="pt-BR"/>
           </a:p>
@@ -592,7 +597,7 @@
           <a:p>
             <a:fld id="{B7ABE7E8-7B11-42D2-9714-455998F959AF}" type="datetimeFigureOut">
               <a:rPr lang="pt-BR" smtClean="0"/>
-              <a:t>08/12/2017</a:t>
+              <a:t>14/12/2017</a:t>
             </a:fld>
             <a:endParaRPr lang="pt-BR"/>
           </a:p>
@@ -762,7 +767,7 @@
           <a:p>
             <a:fld id="{B7ABE7E8-7B11-42D2-9714-455998F959AF}" type="datetimeFigureOut">
               <a:rPr lang="pt-BR" smtClean="0"/>
-              <a:t>08/12/2017</a:t>
+              <a:t>14/12/2017</a:t>
             </a:fld>
             <a:endParaRPr lang="pt-BR"/>
           </a:p>
@@ -1008,7 +1013,7 @@
           <a:p>
             <a:fld id="{B7ABE7E8-7B11-42D2-9714-455998F959AF}" type="datetimeFigureOut">
               <a:rPr lang="pt-BR" smtClean="0"/>
-              <a:t>08/12/2017</a:t>
+              <a:t>14/12/2017</a:t>
             </a:fld>
             <a:endParaRPr lang="pt-BR"/>
           </a:p>
@@ -1240,7 +1245,7 @@
           <a:p>
             <a:fld id="{B7ABE7E8-7B11-42D2-9714-455998F959AF}" type="datetimeFigureOut">
               <a:rPr lang="pt-BR" smtClean="0"/>
-              <a:t>08/12/2017</a:t>
+              <a:t>14/12/2017</a:t>
             </a:fld>
             <a:endParaRPr lang="pt-BR"/>
           </a:p>
@@ -1607,7 +1612,7 @@
           <a:p>
             <a:fld id="{B7ABE7E8-7B11-42D2-9714-455998F959AF}" type="datetimeFigureOut">
               <a:rPr lang="pt-BR" smtClean="0"/>
-              <a:t>08/12/2017</a:t>
+              <a:t>14/12/2017</a:t>
             </a:fld>
             <a:endParaRPr lang="pt-BR"/>
           </a:p>
@@ -1725,7 +1730,7 @@
           <a:p>
             <a:fld id="{B7ABE7E8-7B11-42D2-9714-455998F959AF}" type="datetimeFigureOut">
               <a:rPr lang="pt-BR" smtClean="0"/>
-              <a:t>08/12/2017</a:t>
+              <a:t>14/12/2017</a:t>
             </a:fld>
             <a:endParaRPr lang="pt-BR"/>
           </a:p>
@@ -1820,7 +1825,7 @@
           <a:p>
             <a:fld id="{B7ABE7E8-7B11-42D2-9714-455998F959AF}" type="datetimeFigureOut">
               <a:rPr lang="pt-BR" smtClean="0"/>
-              <a:t>08/12/2017</a:t>
+              <a:t>14/12/2017</a:t>
             </a:fld>
             <a:endParaRPr lang="pt-BR"/>
           </a:p>
@@ -2097,7 +2102,7 @@
           <a:p>
             <a:fld id="{B7ABE7E8-7B11-42D2-9714-455998F959AF}" type="datetimeFigureOut">
               <a:rPr lang="pt-BR" smtClean="0"/>
-              <a:t>08/12/2017</a:t>
+              <a:t>14/12/2017</a:t>
             </a:fld>
             <a:endParaRPr lang="pt-BR"/>
           </a:p>
@@ -2354,7 +2359,7 @@
           <a:p>
             <a:fld id="{B7ABE7E8-7B11-42D2-9714-455998F959AF}" type="datetimeFigureOut">
               <a:rPr lang="pt-BR" smtClean="0"/>
-              <a:t>08/12/2017</a:t>
+              <a:t>14/12/2017</a:t>
             </a:fld>
             <a:endParaRPr lang="pt-BR"/>
           </a:p>
@@ -2567,7 +2572,7 @@
           <a:p>
             <a:fld id="{B7ABE7E8-7B11-42D2-9714-455998F959AF}" type="datetimeFigureOut">
               <a:rPr lang="pt-BR" smtClean="0"/>
-              <a:t>08/12/2017</a:t>
+              <a:t>14/12/2017</a:t>
             </a:fld>
             <a:endParaRPr lang="pt-BR"/>
           </a:p>
@@ -12245,10 +12250,10 @@
       </p:pic>
       <p:pic>
         <p:nvPicPr>
-          <p:cNvPr id="292" name="Imagem 291">
+          <p:cNvPr id="3" name="Imagem 2">
             <a:extLst>
               <a:ext uri="{FF2B5EF4-FFF2-40B4-BE49-F238E27FC236}">
-                <a16:creationId xmlns:a16="http://schemas.microsoft.com/office/drawing/2014/main" id="{A1BD898B-7B02-46E8-83C0-A59017966C51}"/>
+                <a16:creationId xmlns:a16="http://schemas.microsoft.com/office/drawing/2014/main" id="{7769D03E-2B39-44B1-9235-3F3E3AD0AFCE}"/>
               </a:ext>
             </a:extLst>
           </p:cNvPr>
@@ -12275,48 +12280,8 @@
         </p:blipFill>
         <p:spPr>
           <a:xfrm>
-            <a:off x="5949773" y="95693"/>
-            <a:ext cx="301714" cy="317714"/>
-          </a:xfrm>
-          <a:prstGeom prst="rect">
-            <a:avLst/>
-          </a:prstGeom>
-        </p:spPr>
-      </p:pic>
-      <p:pic>
-        <p:nvPicPr>
-          <p:cNvPr id="295" name="Imagem 294">
-            <a:extLst>
-              <a:ext uri="{FF2B5EF4-FFF2-40B4-BE49-F238E27FC236}">
-                <a16:creationId xmlns:a16="http://schemas.microsoft.com/office/drawing/2014/main" id="{A7ADD77D-B88C-43E2-99CE-4A619E6A78C4}"/>
-              </a:ext>
-            </a:extLst>
-          </p:cNvPr>
-          <p:cNvPicPr>
-            <a:picLocks noChangeAspect="1"/>
-          </p:cNvPicPr>
-          <p:nvPr>
-            <p:custDataLst>
-              <p:tags r:id="rId4"/>
-            </p:custDataLst>
-          </p:nvPr>
-        </p:nvPicPr>
-        <p:blipFill>
-          <a:blip r:embed="rId13">
-            <a:extLst>
-              <a:ext uri="{28A0092B-C50C-407E-A947-70E740481C1C}">
-                <a14:useLocalDpi xmlns:a14="http://schemas.microsoft.com/office/drawing/2010/main" val="0"/>
-              </a:ext>
-            </a:extLst>
-          </a:blip>
-          <a:stretch>
-            <a:fillRect/>
-          </a:stretch>
-        </p:blipFill>
-        <p:spPr>
-          <a:xfrm>
-            <a:off x="7339391" y="95696"/>
-            <a:ext cx="327842" cy="371129"/>
+            <a:off x="5908595" y="63280"/>
+            <a:ext cx="350930" cy="364256"/>
           </a:xfrm>
           <a:prstGeom prst="rect">
             <a:avLst/>
@@ -12337,12 +12302,12 @@
           </p:cNvPicPr>
           <p:nvPr>
             <p:custDataLst>
-              <p:tags r:id="rId5"/>
+              <p:tags r:id="rId4"/>
             </p:custDataLst>
           </p:nvPr>
         </p:nvPicPr>
         <p:blipFill>
-          <a:blip r:embed="rId14">
+          <a:blip r:embed="rId13">
             <a:extLst>
               <a:ext uri="{28A0092B-C50C-407E-A947-70E740481C1C}">
                 <a14:useLocalDpi xmlns:a14="http://schemas.microsoft.com/office/drawing/2010/main" val="0"/>
@@ -12377,12 +12342,12 @@
           </p:cNvPicPr>
           <p:nvPr>
             <p:custDataLst>
-              <p:tags r:id="rId6"/>
+              <p:tags r:id="rId5"/>
             </p:custDataLst>
           </p:nvPr>
         </p:nvPicPr>
         <p:blipFill>
-          <a:blip r:embed="rId15">
+          <a:blip r:embed="rId14">
             <a:extLst>
               <a:ext uri="{28A0092B-C50C-407E-A947-70E740481C1C}">
                 <a14:useLocalDpi xmlns:a14="http://schemas.microsoft.com/office/drawing/2010/main" val="0"/>
@@ -12505,7 +12470,7 @@
           </p:cNvPicPr>
           <p:nvPr>
             <p:custDataLst>
-              <p:tags r:id="rId7"/>
+              <p:tags r:id="rId6"/>
             </p:custDataLst>
           </p:nvPr>
         </p:nvPicPr>
@@ -12545,7 +12510,7 @@
           </p:cNvPicPr>
           <p:nvPr>
             <p:custDataLst>
-              <p:tags r:id="rId8"/>
+              <p:tags r:id="rId7"/>
             </p:custDataLst>
           </p:nvPr>
         </p:nvPicPr>
@@ -12659,6 +12624,46 @@
           </a:fontRef>
         </p:style>
       </p:cxnSp>
+      <p:pic>
+        <p:nvPicPr>
+          <p:cNvPr id="24" name="Imagem 23">
+            <a:extLst>
+              <a:ext uri="{FF2B5EF4-FFF2-40B4-BE49-F238E27FC236}">
+                <a16:creationId xmlns:a16="http://schemas.microsoft.com/office/drawing/2014/main" id="{7294499F-3B15-48D1-B2D9-0EB5BA45DB9C}"/>
+              </a:ext>
+            </a:extLst>
+          </p:cNvPr>
+          <p:cNvPicPr>
+            <a:picLocks noChangeAspect="1"/>
+          </p:cNvPicPr>
+          <p:nvPr>
+            <p:custDataLst>
+              <p:tags r:id="rId8"/>
+            </p:custDataLst>
+          </p:nvPr>
+        </p:nvPicPr>
+        <p:blipFill>
+          <a:blip r:embed="rId15">
+            <a:extLst>
+              <a:ext uri="{28A0092B-C50C-407E-A947-70E740481C1C}">
+                <a14:useLocalDpi xmlns:a14="http://schemas.microsoft.com/office/drawing/2010/main" val="0"/>
+              </a:ext>
+            </a:extLst>
+          </a:blip>
+          <a:stretch>
+            <a:fillRect/>
+          </a:stretch>
+        </p:blipFill>
+        <p:spPr>
+          <a:xfrm>
+            <a:off x="7332906" y="64839"/>
+            <a:ext cx="353991" cy="417771"/>
+          </a:xfrm>
+          <a:prstGeom prst="rect">
+            <a:avLst/>
+          </a:prstGeom>
+        </p:spPr>
+      </p:pic>
     </p:spTree>
     <p:extLst>
       <p:ext uri="{BB962C8B-B14F-4D97-AF65-F5344CB8AC3E}">
@@ -12713,11 +12718,11 @@
 <file path=ppt/tags/tag3.xml><?xml version="1.0" encoding="utf-8"?>
 <p:tagLst xmlns:a="http://schemas.openxmlformats.org/drawingml/2006/main" xmlns:r="http://schemas.openxmlformats.org/officeDocument/2006/relationships" xmlns:p="http://schemas.openxmlformats.org/presentationml/2006/main">
   <p:tag name="OUTPUTDPI" val="1200"/>
-  <p:tag name="ORIGINALHEIGHT" val="104,237"/>
-  <p:tag name="ORIGINALWIDTH" val="98,98764"/>
-  <p:tag name="LATEXADDIN" val="\documentclass{article}&#10;\usepackage{amsmath}&#10;\pagestyle{empty}&#10;\begin{document}&#10;&#10;$Y_i$&#10;&#10;&#10;\end{document}"/>
+  <p:tag name="ORIGINALHEIGHT" val="119,2351"/>
+  <p:tag name="ORIGINALWIDTH" val="113,9857"/>
+  <p:tag name="LATEXADDIN" val="\documentclass{article}&#10;\usepackage{amsmath}&#10;\pagestyle{empty}&#10;\begin{document}&#10;&#10;$k_i^{\text{n}}$&#10;&#10;&#10;\end{document}"/>
   <p:tag name="IGUANATEXSIZE" val="30"/>
-  <p:tag name="IGUANATEXCURSOR" val="85"/>
+  <p:tag name="IGUANATEXCURSOR" val="95"/>
   <p:tag name="TRANSPARENCY" val="Verdadeiro"/>
   <p:tag name="FILENAME" val=""/>
   <p:tag name="LATEXENGINEID" val="0"/>
@@ -12730,25 +12735,6 @@
 </file>
 
 <file path=ppt/tags/tag4.xml><?xml version="1.0" encoding="utf-8"?>
-<p:tagLst xmlns:a="http://schemas.openxmlformats.org/drawingml/2006/main" xmlns:r="http://schemas.openxmlformats.org/officeDocument/2006/relationships" xmlns:p="http://schemas.openxmlformats.org/presentationml/2006/main">
-  <p:tag name="OUTPUTDPI" val="1200"/>
-  <p:tag name="ORIGINALHEIGHT" val="121,4848"/>
-  <p:tag name="ORIGINALWIDTH" val="106,4867"/>
-  <p:tag name="LATEXADDIN" val="\documentclass{article}&#10;\usepackage{amsmath}&#10;\pagestyle{empty}&#10;\begin{document}&#10;&#10;$Y_j$&#10;&#10;&#10;\end{document}"/>
-  <p:tag name="IGUANATEXSIZE" val="30"/>
-  <p:tag name="IGUANATEXCURSOR" val="85"/>
-  <p:tag name="TRANSPARENCY" val="Verdadeiro"/>
-  <p:tag name="FILENAME" val=""/>
-  <p:tag name="LATEXENGINEID" val="0"/>
-  <p:tag name="TEMPFOLDER" val="C:\Users\ruanc.LAPTOP-8F2K1OUJ\Downloads\IguanaTeX\"/>
-  <p:tag name="LATEXFORMHEIGHT" val="312"/>
-  <p:tag name="LATEXFORMWIDTH" val="384"/>
-  <p:tag name="LATEXFORMWRAP" val="Verdadeiro"/>
-  <p:tag name="BITMAPVECTOR" val="0"/>
-</p:tagLst>
-</file>
-
-<file path=ppt/tags/tag5.xml><?xml version="1.0" encoding="utf-8"?>
 <p:tagLst xmlns:a="http://schemas.openxmlformats.org/drawingml/2006/main" xmlns:r="http://schemas.openxmlformats.org/officeDocument/2006/relationships" xmlns:p="http://schemas.openxmlformats.org/presentationml/2006/main">
   <p:tag name="OUTPUTDPI" val="1200"/>
   <p:tag name="ORIGINALHEIGHT" val="116,9854"/>
@@ -12767,7 +12753,7 @@
 </p:tagLst>
 </file>
 
-<file path=ppt/tags/tag6.xml><?xml version="1.0" encoding="utf-8"?>
+<file path=ppt/tags/tag5.xml><?xml version="1.0" encoding="utf-8"?>
 <p:tagLst xmlns:a="http://schemas.openxmlformats.org/drawingml/2006/main" xmlns:r="http://schemas.openxmlformats.org/officeDocument/2006/relationships" xmlns:p="http://schemas.openxmlformats.org/presentationml/2006/main">
   <p:tag name="OUTPUTDPI" val="1200"/>
   <p:tag name="ORIGINALHEIGHT" val="134,2332"/>
@@ -12786,7 +12772,7 @@
 </p:tagLst>
 </file>
 
-<file path=ppt/tags/tag7.xml><?xml version="1.0" encoding="utf-8"?>
+<file path=ppt/tags/tag6.xml><?xml version="1.0" encoding="utf-8"?>
 <p:tagLst xmlns:a="http://schemas.openxmlformats.org/drawingml/2006/main" xmlns:r="http://schemas.openxmlformats.org/officeDocument/2006/relationships" xmlns:p="http://schemas.openxmlformats.org/presentationml/2006/main">
   <p:tag name="OUTPUTDPI" val="1200"/>
   <p:tag name="ORIGINALHEIGHT" val="121,4848"/>
@@ -12805,7 +12791,7 @@
 </p:tagLst>
 </file>
 
-<file path=ppt/tags/tag8.xml><?xml version="1.0" encoding="utf-8"?>
+<file path=ppt/tags/tag7.xml><?xml version="1.0" encoding="utf-8"?>
 <p:tagLst xmlns:a="http://schemas.openxmlformats.org/drawingml/2006/main" xmlns:r="http://schemas.openxmlformats.org/officeDocument/2006/relationships" xmlns:p="http://schemas.openxmlformats.org/presentationml/2006/main">
   <p:tag name="OUTPUTDPI" val="1200"/>
   <p:tag name="ORIGINALHEIGHT" val="121,4848"/>
@@ -12813,6 +12799,25 @@
   <p:tag name="LATEXADDIN" val="\documentclass{article}&#10;\usepackage{amsmath,bm}&#10;\pagestyle{empty}&#10;\begin{document}&#10;&#10;$\bm{F}_{ij}$&#10;&#10;&#10;\end{document}"/>
   <p:tag name="IGUANATEXSIZE" val="30"/>
   <p:tag name="IGUANATEXCURSOR" val="95"/>
+  <p:tag name="TRANSPARENCY" val="Verdadeiro"/>
+  <p:tag name="FILENAME" val=""/>
+  <p:tag name="LATEXENGINEID" val="0"/>
+  <p:tag name="TEMPFOLDER" val="C:\Users\ruanc.LAPTOP-8F2K1OUJ\Downloads\IguanaTeX\"/>
+  <p:tag name="LATEXFORMHEIGHT" val="312"/>
+  <p:tag name="LATEXFORMWIDTH" val="384"/>
+  <p:tag name="LATEXFORMWRAP" val="Verdadeiro"/>
+  <p:tag name="BITMAPVECTOR" val="0"/>
+</p:tagLst>
+</file>
+
+<file path=ppt/tags/tag8.xml><?xml version="1.0" encoding="utf-8"?>
+<p:tagLst xmlns:a="http://schemas.openxmlformats.org/drawingml/2006/main" xmlns:r="http://schemas.openxmlformats.org/officeDocument/2006/relationships" xmlns:p="http://schemas.openxmlformats.org/presentationml/2006/main">
+  <p:tag name="OUTPUTDPI" val="1200"/>
+  <p:tag name="ORIGINALHEIGHT" val="136,4829"/>
+  <p:tag name="ORIGINALWIDTH" val="113,9857"/>
+  <p:tag name="LATEXADDIN" val="\documentclass{article}&#10;\usepackage{amsmath}&#10;\pagestyle{empty}&#10;\begin{document}&#10;&#10;$k_j^{\text{n}}$&#10;&#10;&#10;\end{document}"/>
+  <p:tag name="IGUANATEXSIZE" val="30"/>
+  <p:tag name="IGUANATEXCURSOR" val="85"/>
   <p:tag name="TRANSPARENCY" val="Verdadeiro"/>
   <p:tag name="FILENAME" val=""/>
   <p:tag name="LATEXENGINEID" val="0"/>

</xml_diff>